<commit_message>
pdf and pptx updated.
</commit_message>
<xml_diff>
--- a/ELK STACK Sunum.pptx
+++ b/ELK STACK Sunum.pptx
@@ -9066,7 +9066,7 @@
         </p:nvSpPr>
         <p:spPr>
           <a:xfrm>
-            <a:off x="729450" y="2078875"/>
+            <a:off x="729450" y="1946775"/>
             <a:ext cx="4567200" cy="2804400"/>
           </a:xfrm>
           <a:prstGeom prst="rect">
@@ -11026,7 +11026,7 @@
             </a:pPr>
             <a:r>
               <a:rPr lang="tr"/>
-              <a:t>Elasticsearch Nedir?</a:t>
+              <a:t>What is Elasticsearch</a:t>
             </a:r>
             <a:endParaRPr/>
           </a:p>
@@ -11066,15 +11066,7 @@
             </a:pPr>
             <a:r>
               <a:rPr lang="tr"/>
-              <a:t>Elasticsearch, metinsel, sayısal, coğrafik, yapılandırılmış ve yapılandırılmamış her tür veri için dağıtılmış, açık kaynaklı bir arama ve analitik motorudur. </a:t>
-            </a:r>
-            <a:r>
-              <a:rPr b="1" lang="tr"/>
-              <a:t>Restful</a:t>
-            </a:r>
-            <a:r>
-              <a:rPr lang="tr"/>
-              <a:t> servisler ile çalışır. Ölçeklendirmesi mimarisinden kaynaklı kolaydır.</a:t>
+              <a:t>Elasticsearch is a distributed, open source search and analytics engine for all types of data, whether textual, numerical, geographic, structured and unstructured. Works with Restful services. It is easy to scale due to its architecture.</a:t>
             </a:r>
             <a:endParaRPr/>
           </a:p>
@@ -11090,7 +11082,7 @@
             </a:pPr>
             <a:r>
               <a:rPr lang="tr"/>
-              <a:t>Basit tabirler ile, belge odaklı (document-based) ve yarı yapılandırılmış verileri depolayan ve yöneten bir veritabanıdır.</a:t>
+              <a:t>In simple terms, it is a database that stores and manages document-based and semi-structured data.</a:t>
             </a:r>
             <a:endParaRPr/>
           </a:p>
@@ -11213,7 +11205,7 @@
             </a:pPr>
             <a:r>
               <a:rPr lang="tr"/>
-              <a:t>Elasticsearch Neden Kullanılmalıdır?</a:t>
+              <a:t>Why Elasticsearch is used</a:t>
             </a:r>
             <a:endParaRPr/>
           </a:p>
@@ -11258,7 +11250,7 @@
                 <a:cs typeface="PT Serif"/>
                 <a:sym typeface="PT Serif"/>
               </a:rPr>
-              <a:t>E-ticareti ve büyük veritabanlarına sahip arama motorlarını içeren ürünler, çok uzun süren ürün bilgilerinin alınması da dahil olmak üzere sorunlarla karşı karşıyadır. Bu, kötü kullanıcı deneyimine yol açar ve dolayısıyla potansiyel müşterileri kapatır.</a:t>
+              <a:t>Products that include e-commerce and search engines with large databases face problems, including the retrieval of product information that takes too long. This leads to poor user experience and therefore closes potential customers.</a:t>
             </a:r>
             <a:endParaRPr>
               <a:latin typeface="PT Serif"/>
@@ -11284,7 +11276,7 @@
                 <a:cs typeface="PT Serif"/>
                 <a:sym typeface="PT Serif"/>
               </a:rPr>
-              <a:t>Aramada ayrıca, ürün tasarımı için kullanılan ilişkisel veritabanına atfedilen bir gecikme vardır; burada veriler birden çok tablo arasında dağılmıştır ve anlamlı kullanıcı bilgilerinin başarılı bir şekilde alınması, verilerin bu tablolardan alınmasını gerektirir.</a:t>
+              <a:t>Relational database runs relatively slow when it comes to very large data and fetching search results via database queries</a:t>
             </a:r>
             <a:endParaRPr>
               <a:latin typeface="PT Serif"/>
@@ -11305,32 +11297,6 @@
             </a:pPr>
             <a:r>
               <a:rPr lang="tr">
-                <a:latin typeface="PT Serif"/>
-                <a:ea typeface="PT Serif"/>
-                <a:cs typeface="PT Serif"/>
-                <a:sym typeface="PT Serif"/>
-              </a:rPr>
-              <a:t>İlişkisel veritabanı, çok büyük veriler söz konusu olduğunda ve veritabanı sorguları aracılığıyla arama sonuçlarını getirirken nispeten yavaş çalışır</a:t>
-            </a:r>
-            <a:endParaRPr>
-              <a:latin typeface="PT Serif"/>
-              <a:ea typeface="PT Serif"/>
-              <a:cs typeface="PT Serif"/>
-              <a:sym typeface="PT Serif"/>
-            </a:endParaRPr>
-          </a:p>
-          <a:p>
-            <a:pPr indent="0" lvl="0" marL="0" rtl="0" algn="l">
-              <a:spcBef>
-                <a:spcPts val="1600"/>
-              </a:spcBef>
-              <a:spcAft>
-                <a:spcPts val="0"/>
-              </a:spcAft>
-              <a:buNone/>
-            </a:pPr>
-            <a:r>
-              <a:rPr lang="tr">
                 <a:solidFill>
                   <a:srgbClr val="292929"/>
                 </a:solidFill>
@@ -11342,16 +11308,7 @@
                 <a:cs typeface="PT Serif"/>
                 <a:sym typeface="PT Serif"/>
               </a:rPr>
-              <a:t>Eğer büyük veri blokları arasında metin arama (full text search) gibi bir ihtiyacımız varsa, bu durumda Elasticsearch bizim için doğru bir tercih olabilir.</a:t>
-            </a:r>
-            <a:r>
-              <a:rPr lang="tr">
-                <a:latin typeface="PT Serif"/>
-                <a:ea typeface="PT Serif"/>
-                <a:cs typeface="PT Serif"/>
-                <a:sym typeface="PT Serif"/>
-              </a:rPr>
-              <a:t>Genellikle Hadoop / Spark / Flink vs.'den daha hızlı bir çözümdür.</a:t>
+              <a:t>If we need to search for text between large blocks of data, then Elasticsearch may be the right choice for us. It is usually a faster solution than Hadoop / Spark / Flink etc.</a:t>
             </a:r>
             <a:endParaRPr>
               <a:latin typeface="PT Serif"/>

</xml_diff>